<commit_message>
changed WiFi to Wi-Fi to agree with CY standards
</commit_message>
<xml_diff>
--- a/labmanual/WW101-Binder-Cover.pptx
+++ b/labmanual/WW101-Binder-Cover.pptx
@@ -244,7 +244,7 @@
           <a:p>
             <a:fld id="{FD9117CB-CD87-A145-B0DD-B1FF23D56DC0}" type="datetimeFigureOut">
               <a:rPr lang="en-US" smtClean="0"/>
-              <a:t>11/30/2016</a:t>
+              <a:t>1/30/2017</a:t>
             </a:fld>
             <a:endParaRPr lang="en-US"/>
           </a:p>
@@ -414,7 +414,7 @@
           <a:p>
             <a:fld id="{FD9117CB-CD87-A145-B0DD-B1FF23D56DC0}" type="datetimeFigureOut">
               <a:rPr lang="en-US" smtClean="0"/>
-              <a:t>11/30/2016</a:t>
+              <a:t>1/30/2017</a:t>
             </a:fld>
             <a:endParaRPr lang="en-US"/>
           </a:p>
@@ -594,7 +594,7 @@
           <a:p>
             <a:fld id="{FD9117CB-CD87-A145-B0DD-B1FF23D56DC0}" type="datetimeFigureOut">
               <a:rPr lang="en-US" smtClean="0"/>
-              <a:t>11/30/2016</a:t>
+              <a:t>1/30/2017</a:t>
             </a:fld>
             <a:endParaRPr lang="en-US"/>
           </a:p>
@@ -764,7 +764,7 @@
           <a:p>
             <a:fld id="{FD9117CB-CD87-A145-B0DD-B1FF23D56DC0}" type="datetimeFigureOut">
               <a:rPr lang="en-US" smtClean="0"/>
-              <a:t>11/30/2016</a:t>
+              <a:t>1/30/2017</a:t>
             </a:fld>
             <a:endParaRPr lang="en-US"/>
           </a:p>
@@ -1008,7 +1008,7 @@
           <a:p>
             <a:fld id="{FD9117CB-CD87-A145-B0DD-B1FF23D56DC0}" type="datetimeFigureOut">
               <a:rPr lang="en-US" smtClean="0"/>
-              <a:t>11/30/2016</a:t>
+              <a:t>1/30/2017</a:t>
             </a:fld>
             <a:endParaRPr lang="en-US"/>
           </a:p>
@@ -1240,7 +1240,7 @@
           <a:p>
             <a:fld id="{FD9117CB-CD87-A145-B0DD-B1FF23D56DC0}" type="datetimeFigureOut">
               <a:rPr lang="en-US" smtClean="0"/>
-              <a:t>11/30/2016</a:t>
+              <a:t>1/30/2017</a:t>
             </a:fld>
             <a:endParaRPr lang="en-US"/>
           </a:p>
@@ -1607,7 +1607,7 @@
           <a:p>
             <a:fld id="{FD9117CB-CD87-A145-B0DD-B1FF23D56DC0}" type="datetimeFigureOut">
               <a:rPr lang="en-US" smtClean="0"/>
-              <a:t>11/30/2016</a:t>
+              <a:t>1/30/2017</a:t>
             </a:fld>
             <a:endParaRPr lang="en-US"/>
           </a:p>
@@ -1725,7 +1725,7 @@
           <a:p>
             <a:fld id="{FD9117CB-CD87-A145-B0DD-B1FF23D56DC0}" type="datetimeFigureOut">
               <a:rPr lang="en-US" smtClean="0"/>
-              <a:t>11/30/2016</a:t>
+              <a:t>1/30/2017</a:t>
             </a:fld>
             <a:endParaRPr lang="en-US"/>
           </a:p>
@@ -1820,7 +1820,7 @@
           <a:p>
             <a:fld id="{FD9117CB-CD87-A145-B0DD-B1FF23D56DC0}" type="datetimeFigureOut">
               <a:rPr lang="en-US" smtClean="0"/>
-              <a:t>11/30/2016</a:t>
+              <a:t>1/30/2017</a:t>
             </a:fld>
             <a:endParaRPr lang="en-US"/>
           </a:p>
@@ -2097,7 +2097,7 @@
           <a:p>
             <a:fld id="{FD9117CB-CD87-A145-B0DD-B1FF23D56DC0}" type="datetimeFigureOut">
               <a:rPr lang="en-US" smtClean="0"/>
-              <a:t>11/30/2016</a:t>
+              <a:t>1/30/2017</a:t>
             </a:fld>
             <a:endParaRPr lang="en-US"/>
           </a:p>
@@ -2354,7 +2354,7 @@
           <a:p>
             <a:fld id="{FD9117CB-CD87-A145-B0DD-B1FF23D56DC0}" type="datetimeFigureOut">
               <a:rPr lang="en-US" smtClean="0"/>
-              <a:t>11/30/2016</a:t>
+              <a:t>1/30/2017</a:t>
             </a:fld>
             <a:endParaRPr lang="en-US"/>
           </a:p>
@@ -2567,7 +2567,7 @@
           <a:p>
             <a:fld id="{FD9117CB-CD87-A145-B0DD-B1FF23D56DC0}" type="datetimeFigureOut">
               <a:rPr lang="en-US" smtClean="0"/>
-              <a:t>11/30/2016</a:t>
+              <a:t>1/30/2017</a:t>
             </a:fld>
             <a:endParaRPr lang="en-US"/>
           </a:p>
@@ -3031,12 +3031,12 @@
               <a:t>WICED </a:t>
             </a:r>
             <a:r>
-              <a:rPr lang="en-US" sz="7200" dirty="0" err="1" smtClean="0"/>
-              <a:t>WiFi</a:t>
-            </a:r>
-            <a:r>
               <a:rPr lang="en-US" sz="7200" dirty="0" smtClean="0"/>
-              <a:t> 101</a:t>
+              <a:t>Wi-Fi </a:t>
+            </a:r>
+            <a:r>
+              <a:rPr lang="en-US" sz="7200" dirty="0" smtClean="0"/>
+              <a:t>101</a:t>
             </a:r>
             <a:endParaRPr lang="en-US" sz="7200" dirty="0"/>
           </a:p>
@@ -3149,15 +3149,7 @@
             <a:pPr algn="ctr"/>
             <a:r>
               <a:rPr lang="en-US" dirty="0" smtClean="0"/>
-              <a:t>WPA2 SSID = </a:t>
-            </a:r>
-            <a:r>
-              <a:rPr lang="en-US" dirty="0" smtClean="0"/>
-              <a:t>WW101WPA </a:t>
-            </a:r>
-            <a:r>
-              <a:rPr lang="en-US" dirty="0" smtClean="0"/>
-              <a:t>PW=</a:t>
+              <a:t>WPA2 SSID = WW101WPA PW=</a:t>
             </a:r>
             <a:r>
               <a:rPr lang="en-US" dirty="0"/>
@@ -3230,11 +3222,7 @@
             <a:pPr algn="ctr"/>
             <a:r>
               <a:rPr lang="en-US" dirty="0" smtClean="0"/>
-              <a:t>wwep.ww101.cypress.com </a:t>
-            </a:r>
-            <a:r>
-              <a:rPr lang="en-US" dirty="0" smtClean="0"/>
-              <a:t>IP Address = 198.51.100.3</a:t>
+              <a:t>wwep.ww101.cypress.com IP Address = 198.51.100.3</a:t>
             </a:r>
           </a:p>
         </p:txBody>
@@ -3264,13 +3252,8 @@
             <a:pPr algn="ctr"/>
             <a:r>
               <a:rPr lang="en-US" dirty="0" smtClean="0"/>
-              <a:t>OPEN SSID = </a:t>
-            </a:r>
-            <a:r>
-              <a:rPr lang="en-US" dirty="0" smtClean="0"/>
-              <a:t>WW101OPEN</a:t>
-            </a:r>
-            <a:endParaRPr lang="en-US" dirty="0" smtClean="0"/>
+              <a:t>OPEN SSID = WW101OPEN</a:t>
+            </a:r>
           </a:p>
         </p:txBody>
       </p:sp>
@@ -3299,15 +3282,7 @@
             <a:pPr algn="ctr"/>
             <a:r>
               <a:rPr lang="en-US" dirty="0" smtClean="0"/>
-              <a:t>WEP SSID = </a:t>
-            </a:r>
-            <a:r>
-              <a:rPr lang="en-US" dirty="0" smtClean="0"/>
-              <a:t>WW101WEP </a:t>
-            </a:r>
-            <a:r>
-              <a:rPr lang="en-US" dirty="0" smtClean="0"/>
-              <a:t>PW=</a:t>
+              <a:t>WEP SSID = WW101WEP PW=</a:t>
             </a:r>
             <a:r>
               <a:rPr lang="en-US" dirty="0" err="1" smtClean="0"/>

</xml_diff>

<commit_message>
added a version number textbox to the cover
</commit_message>
<xml_diff>
--- a/labmanual/WW101-Binder-Cover.pptx
+++ b/labmanual/WW101-Binder-Cover.pptx
@@ -244,7 +244,7 @@
           <a:p>
             <a:fld id="{FD9117CB-CD87-A145-B0DD-B1FF23D56DC0}" type="datetimeFigureOut">
               <a:rPr lang="en-US" smtClean="0"/>
-              <a:t>1/30/2017</a:t>
+              <a:t>1/31/2017</a:t>
             </a:fld>
             <a:endParaRPr lang="en-US"/>
           </a:p>
@@ -414,7 +414,7 @@
           <a:p>
             <a:fld id="{FD9117CB-CD87-A145-B0DD-B1FF23D56DC0}" type="datetimeFigureOut">
               <a:rPr lang="en-US" smtClean="0"/>
-              <a:t>1/30/2017</a:t>
+              <a:t>1/31/2017</a:t>
             </a:fld>
             <a:endParaRPr lang="en-US"/>
           </a:p>
@@ -594,7 +594,7 @@
           <a:p>
             <a:fld id="{FD9117CB-CD87-A145-B0DD-B1FF23D56DC0}" type="datetimeFigureOut">
               <a:rPr lang="en-US" smtClean="0"/>
-              <a:t>1/30/2017</a:t>
+              <a:t>1/31/2017</a:t>
             </a:fld>
             <a:endParaRPr lang="en-US"/>
           </a:p>
@@ -764,7 +764,7 @@
           <a:p>
             <a:fld id="{FD9117CB-CD87-A145-B0DD-B1FF23D56DC0}" type="datetimeFigureOut">
               <a:rPr lang="en-US" smtClean="0"/>
-              <a:t>1/30/2017</a:t>
+              <a:t>1/31/2017</a:t>
             </a:fld>
             <a:endParaRPr lang="en-US"/>
           </a:p>
@@ -1008,7 +1008,7 @@
           <a:p>
             <a:fld id="{FD9117CB-CD87-A145-B0DD-B1FF23D56DC0}" type="datetimeFigureOut">
               <a:rPr lang="en-US" smtClean="0"/>
-              <a:t>1/30/2017</a:t>
+              <a:t>1/31/2017</a:t>
             </a:fld>
             <a:endParaRPr lang="en-US"/>
           </a:p>
@@ -1240,7 +1240,7 @@
           <a:p>
             <a:fld id="{FD9117CB-CD87-A145-B0DD-B1FF23D56DC0}" type="datetimeFigureOut">
               <a:rPr lang="en-US" smtClean="0"/>
-              <a:t>1/30/2017</a:t>
+              <a:t>1/31/2017</a:t>
             </a:fld>
             <a:endParaRPr lang="en-US"/>
           </a:p>
@@ -1607,7 +1607,7 @@
           <a:p>
             <a:fld id="{FD9117CB-CD87-A145-B0DD-B1FF23D56DC0}" type="datetimeFigureOut">
               <a:rPr lang="en-US" smtClean="0"/>
-              <a:t>1/30/2017</a:t>
+              <a:t>1/31/2017</a:t>
             </a:fld>
             <a:endParaRPr lang="en-US"/>
           </a:p>
@@ -1725,7 +1725,7 @@
           <a:p>
             <a:fld id="{FD9117CB-CD87-A145-B0DD-B1FF23D56DC0}" type="datetimeFigureOut">
               <a:rPr lang="en-US" smtClean="0"/>
-              <a:t>1/30/2017</a:t>
+              <a:t>1/31/2017</a:t>
             </a:fld>
             <a:endParaRPr lang="en-US"/>
           </a:p>
@@ -1820,7 +1820,7 @@
           <a:p>
             <a:fld id="{FD9117CB-CD87-A145-B0DD-B1FF23D56DC0}" type="datetimeFigureOut">
               <a:rPr lang="en-US" smtClean="0"/>
-              <a:t>1/30/2017</a:t>
+              <a:t>1/31/2017</a:t>
             </a:fld>
             <a:endParaRPr lang="en-US"/>
           </a:p>
@@ -2097,7 +2097,7 @@
           <a:p>
             <a:fld id="{FD9117CB-CD87-A145-B0DD-B1FF23D56DC0}" type="datetimeFigureOut">
               <a:rPr lang="en-US" smtClean="0"/>
-              <a:t>1/30/2017</a:t>
+              <a:t>1/31/2017</a:t>
             </a:fld>
             <a:endParaRPr lang="en-US"/>
           </a:p>
@@ -2354,7 +2354,7 @@
           <a:p>
             <a:fld id="{FD9117CB-CD87-A145-B0DD-B1FF23D56DC0}" type="datetimeFigureOut">
               <a:rPr lang="en-US" smtClean="0"/>
-              <a:t>1/30/2017</a:t>
+              <a:t>1/31/2017</a:t>
             </a:fld>
             <a:endParaRPr lang="en-US"/>
           </a:p>
@@ -2567,7 +2567,7 @@
           <a:p>
             <a:fld id="{FD9117CB-CD87-A145-B0DD-B1FF23D56DC0}" type="datetimeFigureOut">
               <a:rPr lang="en-US" smtClean="0"/>
-              <a:t>1/30/2017</a:t>
+              <a:t>1/31/2017</a:t>
             </a:fld>
             <a:endParaRPr lang="en-US"/>
           </a:p>
@@ -3028,15 +3028,7 @@
             <a:pPr algn="ctr"/>
             <a:r>
               <a:rPr lang="en-US" sz="7200" dirty="0" smtClean="0"/>
-              <a:t>WICED </a:t>
-            </a:r>
-            <a:r>
-              <a:rPr lang="en-US" sz="7200" dirty="0" smtClean="0"/>
-              <a:t>Wi-Fi </a:t>
-            </a:r>
-            <a:r>
-              <a:rPr lang="en-US" sz="7200" dirty="0" smtClean="0"/>
-              <a:t>101</a:t>
+              <a:t>WICED Wi-Fi 101</a:t>
             </a:r>
             <a:endParaRPr lang="en-US" sz="7200" dirty="0"/>
           </a:p>
@@ -3357,6 +3349,40 @@
               <a:t>DNS2: 8.8.4.4</a:t>
             </a:r>
             <a:endParaRPr lang="en-US" dirty="0"/>
+          </a:p>
+        </p:txBody>
+      </p:sp>
+      <p:sp>
+        <p:nvSpPr>
+          <p:cNvPr id="8" name="TextBox 7"/>
+          <p:cNvSpPr txBox="1"/>
+          <p:nvPr/>
+        </p:nvSpPr>
+        <p:spPr>
+          <a:xfrm>
+            <a:off x="6036493" y="8812800"/>
+            <a:ext cx="785793" cy="253916"/>
+          </a:xfrm>
+          <a:prstGeom prst="rect">
+            <a:avLst/>
+          </a:prstGeom>
+          <a:noFill/>
+        </p:spPr>
+        <p:txBody>
+          <a:bodyPr wrap="none" rtlCol="0">
+            <a:spAutoFit/>
+          </a:bodyPr>
+          <a:lstStyle/>
+          <a:p>
+            <a:r>
+              <a:rPr lang="en-US" sz="1050"/>
+              <a:t>v</a:t>
+            </a:r>
+            <a:r>
+              <a:rPr lang="en-US" sz="1050" smtClean="0"/>
+              <a:t>ersion 1.1</a:t>
+            </a:r>
+            <a:endParaRPr lang="en-US" sz="1050" dirty="0"/>
           </a:p>
         </p:txBody>
       </p:sp>

</xml_diff>

<commit_message>
minor typo corrections, add MNO and VIRK to author list
</commit_message>
<xml_diff>
--- a/labmanual/WW101-Binder-Cover.pptx
+++ b/labmanual/WW101-Binder-Cover.pptx
@@ -244,7 +244,7 @@
           <a:p>
             <a:fld id="{FD9117CB-CD87-A145-B0DD-B1FF23D56DC0}" type="datetimeFigureOut">
               <a:rPr lang="en-US" smtClean="0"/>
-              <a:t>1/31/2017</a:t>
+              <a:t>2/1/2017</a:t>
             </a:fld>
             <a:endParaRPr lang="en-US"/>
           </a:p>
@@ -414,7 +414,7 @@
           <a:p>
             <a:fld id="{FD9117CB-CD87-A145-B0DD-B1FF23D56DC0}" type="datetimeFigureOut">
               <a:rPr lang="en-US" smtClean="0"/>
-              <a:t>1/31/2017</a:t>
+              <a:t>2/1/2017</a:t>
             </a:fld>
             <a:endParaRPr lang="en-US"/>
           </a:p>
@@ -594,7 +594,7 @@
           <a:p>
             <a:fld id="{FD9117CB-CD87-A145-B0DD-B1FF23D56DC0}" type="datetimeFigureOut">
               <a:rPr lang="en-US" smtClean="0"/>
-              <a:t>1/31/2017</a:t>
+              <a:t>2/1/2017</a:t>
             </a:fld>
             <a:endParaRPr lang="en-US"/>
           </a:p>
@@ -764,7 +764,7 @@
           <a:p>
             <a:fld id="{FD9117CB-CD87-A145-B0DD-B1FF23D56DC0}" type="datetimeFigureOut">
               <a:rPr lang="en-US" smtClean="0"/>
-              <a:t>1/31/2017</a:t>
+              <a:t>2/1/2017</a:t>
             </a:fld>
             <a:endParaRPr lang="en-US"/>
           </a:p>
@@ -1008,7 +1008,7 @@
           <a:p>
             <a:fld id="{FD9117CB-CD87-A145-B0DD-B1FF23D56DC0}" type="datetimeFigureOut">
               <a:rPr lang="en-US" smtClean="0"/>
-              <a:t>1/31/2017</a:t>
+              <a:t>2/1/2017</a:t>
             </a:fld>
             <a:endParaRPr lang="en-US"/>
           </a:p>
@@ -1240,7 +1240,7 @@
           <a:p>
             <a:fld id="{FD9117CB-CD87-A145-B0DD-B1FF23D56DC0}" type="datetimeFigureOut">
               <a:rPr lang="en-US" smtClean="0"/>
-              <a:t>1/31/2017</a:t>
+              <a:t>2/1/2017</a:t>
             </a:fld>
             <a:endParaRPr lang="en-US"/>
           </a:p>
@@ -1607,7 +1607,7 @@
           <a:p>
             <a:fld id="{FD9117CB-CD87-A145-B0DD-B1FF23D56DC0}" type="datetimeFigureOut">
               <a:rPr lang="en-US" smtClean="0"/>
-              <a:t>1/31/2017</a:t>
+              <a:t>2/1/2017</a:t>
             </a:fld>
             <a:endParaRPr lang="en-US"/>
           </a:p>
@@ -1725,7 +1725,7 @@
           <a:p>
             <a:fld id="{FD9117CB-CD87-A145-B0DD-B1FF23D56DC0}" type="datetimeFigureOut">
               <a:rPr lang="en-US" smtClean="0"/>
-              <a:t>1/31/2017</a:t>
+              <a:t>2/1/2017</a:t>
             </a:fld>
             <a:endParaRPr lang="en-US"/>
           </a:p>
@@ -1820,7 +1820,7 @@
           <a:p>
             <a:fld id="{FD9117CB-CD87-A145-B0DD-B1FF23D56DC0}" type="datetimeFigureOut">
               <a:rPr lang="en-US" smtClean="0"/>
-              <a:t>1/31/2017</a:t>
+              <a:t>2/1/2017</a:t>
             </a:fld>
             <a:endParaRPr lang="en-US"/>
           </a:p>
@@ -2097,7 +2097,7 @@
           <a:p>
             <a:fld id="{FD9117CB-CD87-A145-B0DD-B1FF23D56DC0}" type="datetimeFigureOut">
               <a:rPr lang="en-US" smtClean="0"/>
-              <a:t>1/31/2017</a:t>
+              <a:t>2/1/2017</a:t>
             </a:fld>
             <a:endParaRPr lang="en-US"/>
           </a:p>
@@ -2354,7 +2354,7 @@
           <a:p>
             <a:fld id="{FD9117CB-CD87-A145-B0DD-B1FF23D56DC0}" type="datetimeFigureOut">
               <a:rPr lang="en-US" smtClean="0"/>
-              <a:t>1/31/2017</a:t>
+              <a:t>2/1/2017</a:t>
             </a:fld>
             <a:endParaRPr lang="en-US"/>
           </a:p>
@@ -2567,7 +2567,7 @@
           <a:p>
             <a:fld id="{FD9117CB-CD87-A145-B0DD-B1FF23D56DC0}" type="datetimeFigureOut">
               <a:rPr lang="en-US" smtClean="0"/>
-              <a:t>1/31/2017</a:t>
+              <a:t>2/1/2017</a:t>
             </a:fld>
             <a:endParaRPr lang="en-US"/>
           </a:p>
@@ -3043,7 +3043,7 @@
         <p:spPr>
           <a:xfrm>
             <a:off x="0" y="6785672"/>
-            <a:ext cx="6858000" cy="1200329"/>
+            <a:ext cx="6858000" cy="1938992"/>
           </a:xfrm>
           <a:prstGeom prst="rect">
             <a:avLst/>
@@ -3066,14 +3066,37 @@
             <a:pPr algn="ctr"/>
             <a:r>
               <a:rPr lang="en-US" sz="2400" dirty="0" smtClean="0"/>
-              <a:t>Greg Landry</a:t>
+              <a:t>Greg </a:t>
+            </a:r>
+            <a:r>
+              <a:rPr lang="en-US" sz="2400" dirty="0" smtClean="0"/>
+              <a:t>Landry</a:t>
             </a:r>
           </a:p>
           <a:p>
             <a:pPr algn="ctr"/>
             <a:r>
               <a:rPr lang="en-US" sz="2400" dirty="0" smtClean="0"/>
-              <a:t>James Dougherty</a:t>
+              <a:t>Mike Noel</a:t>
+            </a:r>
+            <a:endParaRPr lang="en-US" sz="2400" dirty="0" smtClean="0"/>
+          </a:p>
+          <a:p>
+            <a:pPr algn="ctr"/>
+            <a:r>
+              <a:rPr lang="en-US" sz="2400" dirty="0" smtClean="0"/>
+              <a:t>James </a:t>
+            </a:r>
+            <a:r>
+              <a:rPr lang="en-US" sz="2400" dirty="0" smtClean="0"/>
+              <a:t>Dougherty</a:t>
+            </a:r>
+          </a:p>
+          <a:p>
+            <a:pPr algn="ctr"/>
+            <a:r>
+              <a:rPr lang="en-US" sz="2400" dirty="0" smtClean="0"/>
+              <a:t>Vikram Ramanna</a:t>
             </a:r>
             <a:endParaRPr lang="en-US" sz="2400" dirty="0"/>
           </a:p>

</xml_diff>